<commit_message>
Changes in the architecture ppt
</commit_message>
<xml_diff>
--- a/Employee_Database/Architecture.pptx
+++ b/Employee_Database/Architecture.pptx
@@ -115,7 +115,7 @@
 <file path=ppt/revisionInfo.xml><?xml version="1.0" encoding="utf-8"?>
 <p1510:revInfo xmlns:a="http://schemas.openxmlformats.org/drawingml/2006/main" xmlns:r="http://schemas.openxmlformats.org/officeDocument/2006/relationships" xmlns:p1510="http://schemas.microsoft.com/office/powerpoint/2015/10/main">
   <p1510:revLst>
-    <p1510:client id="{51C1528E-FBFE-4B44-853C-CF845D5DE377}" v="1" dt="2023-11-26T07:18:44.385"/>
+    <p1510:client id="{51C1528E-FBFE-4B44-853C-CF845D5DE377}" v="2" dt="2023-12-03T06:56:28.454"/>
   </p1510:revLst>
 </p1510:revInfo>
 </file>
@@ -125,12 +125,12 @@
   <pc:docChgLst>
     <pc:chgData name="Rahul Tiwari" userId="20f5da7b08bbad26" providerId="LiveId" clId="{51C1528E-FBFE-4B44-853C-CF845D5DE377}"/>
     <pc:docChg chg="custSel modSld">
-      <pc:chgData name="Rahul Tiwari" userId="20f5da7b08bbad26" providerId="LiveId" clId="{51C1528E-FBFE-4B44-853C-CF845D5DE377}" dt="2023-11-26T07:20:46.713" v="68" actId="207"/>
+      <pc:chgData name="Rahul Tiwari" userId="20f5da7b08bbad26" providerId="LiveId" clId="{51C1528E-FBFE-4B44-853C-CF845D5DE377}" dt="2023-12-03T06:56:41.772" v="98" actId="113"/>
       <pc:docMkLst>
         <pc:docMk/>
       </pc:docMkLst>
       <pc:sldChg chg="addSp modSp mod">
-        <pc:chgData name="Rahul Tiwari" userId="20f5da7b08bbad26" providerId="LiveId" clId="{51C1528E-FBFE-4B44-853C-CF845D5DE377}" dt="2023-11-26T07:20:46.713" v="68" actId="207"/>
+        <pc:chgData name="Rahul Tiwari" userId="20f5da7b08bbad26" providerId="LiveId" clId="{51C1528E-FBFE-4B44-853C-CF845D5DE377}" dt="2023-12-03T06:56:41.772" v="98" actId="113"/>
         <pc:sldMkLst>
           <pc:docMk/>
           <pc:sldMk cId="1307595117" sldId="256"/>
@@ -157,6 +157,14 @@
             <pc:docMk/>
             <pc:sldMk cId="1307595117" sldId="256"/>
             <ac:spMk id="4" creationId="{313A6304-4A43-264A-05C4-7468A7055738}"/>
+          </ac:spMkLst>
+        </pc:spChg>
+        <pc:spChg chg="add mod">
+          <ac:chgData name="Rahul Tiwari" userId="20f5da7b08bbad26" providerId="LiveId" clId="{51C1528E-FBFE-4B44-853C-CF845D5DE377}" dt="2023-12-03T06:56:41.772" v="98" actId="113"/>
+          <ac:spMkLst>
+            <pc:docMk/>
+            <pc:sldMk cId="1307595117" sldId="256"/>
+            <ac:spMk id="14" creationId="{550A0D48-F725-5A5E-42F9-3790FE5934CD}"/>
           </ac:spMkLst>
         </pc:spChg>
         <pc:spChg chg="mod">
@@ -418,7 +426,7 @@
           <a:p>
             <a:fld id="{A8DA362A-24C9-443C-91B2-D46C16A33949}" type="datetimeFigureOut">
               <a:rPr lang="en-IN" smtClean="0"/>
-              <a:t>26-11-2023</a:t>
+              <a:t>03-12-2023</a:t>
             </a:fld>
             <a:endParaRPr lang="en-IN"/>
           </a:p>
@@ -618,7 +626,7 @@
           <a:p>
             <a:fld id="{A8DA362A-24C9-443C-91B2-D46C16A33949}" type="datetimeFigureOut">
               <a:rPr lang="en-IN" smtClean="0"/>
-              <a:t>26-11-2023</a:t>
+              <a:t>03-12-2023</a:t>
             </a:fld>
             <a:endParaRPr lang="en-IN"/>
           </a:p>
@@ -828,7 +836,7 @@
           <a:p>
             <a:fld id="{A8DA362A-24C9-443C-91B2-D46C16A33949}" type="datetimeFigureOut">
               <a:rPr lang="en-IN" smtClean="0"/>
-              <a:t>26-11-2023</a:t>
+              <a:t>03-12-2023</a:t>
             </a:fld>
             <a:endParaRPr lang="en-IN"/>
           </a:p>
@@ -1028,7 +1036,7 @@
           <a:p>
             <a:fld id="{A8DA362A-24C9-443C-91B2-D46C16A33949}" type="datetimeFigureOut">
               <a:rPr lang="en-IN" smtClean="0"/>
-              <a:t>26-11-2023</a:t>
+              <a:t>03-12-2023</a:t>
             </a:fld>
             <a:endParaRPr lang="en-IN"/>
           </a:p>
@@ -1304,7 +1312,7 @@
           <a:p>
             <a:fld id="{A8DA362A-24C9-443C-91B2-D46C16A33949}" type="datetimeFigureOut">
               <a:rPr lang="en-IN" smtClean="0"/>
-              <a:t>26-11-2023</a:t>
+              <a:t>03-12-2023</a:t>
             </a:fld>
             <a:endParaRPr lang="en-IN"/>
           </a:p>
@@ -1572,7 +1580,7 @@
           <a:p>
             <a:fld id="{A8DA362A-24C9-443C-91B2-D46C16A33949}" type="datetimeFigureOut">
               <a:rPr lang="en-IN" smtClean="0"/>
-              <a:t>26-11-2023</a:t>
+              <a:t>03-12-2023</a:t>
             </a:fld>
             <a:endParaRPr lang="en-IN"/>
           </a:p>
@@ -1987,7 +1995,7 @@
           <a:p>
             <a:fld id="{A8DA362A-24C9-443C-91B2-D46C16A33949}" type="datetimeFigureOut">
               <a:rPr lang="en-IN" smtClean="0"/>
-              <a:t>26-11-2023</a:t>
+              <a:t>03-12-2023</a:t>
             </a:fld>
             <a:endParaRPr lang="en-IN"/>
           </a:p>
@@ -2129,7 +2137,7 @@
           <a:p>
             <a:fld id="{A8DA362A-24C9-443C-91B2-D46C16A33949}" type="datetimeFigureOut">
               <a:rPr lang="en-IN" smtClean="0"/>
-              <a:t>26-11-2023</a:t>
+              <a:t>03-12-2023</a:t>
             </a:fld>
             <a:endParaRPr lang="en-IN"/>
           </a:p>
@@ -2242,7 +2250,7 @@
           <a:p>
             <a:fld id="{A8DA362A-24C9-443C-91B2-D46C16A33949}" type="datetimeFigureOut">
               <a:rPr lang="en-IN" smtClean="0"/>
-              <a:t>26-11-2023</a:t>
+              <a:t>03-12-2023</a:t>
             </a:fld>
             <a:endParaRPr lang="en-IN"/>
           </a:p>
@@ -2555,7 +2563,7 @@
           <a:p>
             <a:fld id="{A8DA362A-24C9-443C-91B2-D46C16A33949}" type="datetimeFigureOut">
               <a:rPr lang="en-IN" smtClean="0"/>
-              <a:t>26-11-2023</a:t>
+              <a:t>03-12-2023</a:t>
             </a:fld>
             <a:endParaRPr lang="en-IN"/>
           </a:p>
@@ -2844,7 +2852,7 @@
           <a:p>
             <a:fld id="{A8DA362A-24C9-443C-91B2-D46C16A33949}" type="datetimeFigureOut">
               <a:rPr lang="en-IN" smtClean="0"/>
-              <a:t>26-11-2023</a:t>
+              <a:t>03-12-2023</a:t>
             </a:fld>
             <a:endParaRPr lang="en-IN"/>
           </a:p>
@@ -3087,7 +3095,7 @@
           <a:p>
             <a:fld id="{A8DA362A-24C9-443C-91B2-D46C16A33949}" type="datetimeFigureOut">
               <a:rPr lang="en-IN" smtClean="0"/>
-              <a:t>26-11-2023</a:t>
+              <a:t>03-12-2023</a:t>
             </a:fld>
             <a:endParaRPr lang="en-IN"/>
           </a:p>
@@ -6273,6 +6281,42 @@
           </a:p>
         </p:txBody>
       </p:sp>
+      <p:sp>
+        <p:nvSpPr>
+          <p:cNvPr id="14" name="TextBox 13">
+            <a:extLst>
+              <a:ext uri="{FF2B5EF4-FFF2-40B4-BE49-F238E27FC236}">
+                <a16:creationId xmlns:a16="http://schemas.microsoft.com/office/drawing/2014/main" id="{550A0D48-F725-5A5E-42F9-3790FE5934CD}"/>
+              </a:ext>
+            </a:extLst>
+          </p:cNvPr>
+          <p:cNvSpPr txBox="1"/>
+          <p:nvPr/>
+        </p:nvSpPr>
+        <p:spPr>
+          <a:xfrm>
+            <a:off x="9296570" y="6194945"/>
+            <a:ext cx="2825517" cy="369332"/>
+          </a:xfrm>
+          <a:prstGeom prst="rect">
+            <a:avLst/>
+          </a:prstGeom>
+          <a:noFill/>
+        </p:spPr>
+        <p:txBody>
+          <a:bodyPr wrap="none" rtlCol="0">
+            <a:spAutoFit/>
+          </a:bodyPr>
+          <a:lstStyle/>
+          <a:p>
+            <a:r>
+              <a:rPr lang="en-US" b="1" dirty="0"/>
+              <a:t>HRDB Architecture Diagram</a:t>
+            </a:r>
+            <a:endParaRPr lang="en-IN" b="1" dirty="0"/>
+          </a:p>
+        </p:txBody>
+      </p:sp>
     </p:spTree>
     <p:extLst>
       <p:ext uri="{BB962C8B-B14F-4D97-AF65-F5344CB8AC3E}">

</xml_diff>